<commit_message>
Rest of model pipeline to come
</commit_message>
<xml_diff>
--- a/Cal_presentation.pptx
+++ b/Cal_presentation.pptx
@@ -322,7 +322,7 @@
             <a:fld id="{1D8BD707-D9CF-40AE-B4C6-C98DA3205C09}" type="datetimeFigureOut">
               <a:rPr lang="en-US" smtClean="0"/>
               <a:pPr/>
-              <a:t>3/11/2024</a:t>
+              <a:t>3/12/2024</a:t>
             </a:fld>
             <a:endParaRPr lang="en-US"/>
           </a:p>
@@ -487,7 +487,7 @@
             <a:fld id="{1D8BD707-D9CF-40AE-B4C6-C98DA3205C09}" type="datetimeFigureOut">
               <a:rPr lang="en-US" smtClean="0"/>
               <a:pPr/>
-              <a:t>3/11/2024</a:t>
+              <a:t>3/12/2024</a:t>
             </a:fld>
             <a:endParaRPr lang="en-US"/>
           </a:p>
@@ -662,7 +662,7 @@
             <a:fld id="{1D8BD707-D9CF-40AE-B4C6-C98DA3205C09}" type="datetimeFigureOut">
               <a:rPr lang="en-US" smtClean="0"/>
               <a:pPr/>
-              <a:t>3/11/2024</a:t>
+              <a:t>3/12/2024</a:t>
             </a:fld>
             <a:endParaRPr lang="en-US"/>
           </a:p>
@@ -827,7 +827,7 @@
             <a:fld id="{1D8BD707-D9CF-40AE-B4C6-C98DA3205C09}" type="datetimeFigureOut">
               <a:rPr lang="en-US" smtClean="0"/>
               <a:pPr/>
-              <a:t>3/11/2024</a:t>
+              <a:t>3/12/2024</a:t>
             </a:fld>
             <a:endParaRPr lang="en-US"/>
           </a:p>
@@ -1069,7 +1069,7 @@
             <a:fld id="{1D8BD707-D9CF-40AE-B4C6-C98DA3205C09}" type="datetimeFigureOut">
               <a:rPr lang="en-US" smtClean="0"/>
               <a:pPr/>
-              <a:t>3/11/2024</a:t>
+              <a:t>3/12/2024</a:t>
             </a:fld>
             <a:endParaRPr lang="en-US"/>
           </a:p>
@@ -1351,7 +1351,7 @@
             <a:fld id="{1D8BD707-D9CF-40AE-B4C6-C98DA3205C09}" type="datetimeFigureOut">
               <a:rPr lang="en-US" smtClean="0"/>
               <a:pPr/>
-              <a:t>3/11/2024</a:t>
+              <a:t>3/12/2024</a:t>
             </a:fld>
             <a:endParaRPr lang="en-US"/>
           </a:p>
@@ -1767,7 +1767,7 @@
             <a:fld id="{1D8BD707-D9CF-40AE-B4C6-C98DA3205C09}" type="datetimeFigureOut">
               <a:rPr lang="en-US" smtClean="0"/>
               <a:pPr/>
-              <a:t>3/11/2024</a:t>
+              <a:t>3/12/2024</a:t>
             </a:fld>
             <a:endParaRPr lang="en-US"/>
           </a:p>
@@ -1881,7 +1881,7 @@
             <a:fld id="{1D8BD707-D9CF-40AE-B4C6-C98DA3205C09}" type="datetimeFigureOut">
               <a:rPr lang="en-US" smtClean="0"/>
               <a:pPr/>
-              <a:t>3/11/2024</a:t>
+              <a:t>3/12/2024</a:t>
             </a:fld>
             <a:endParaRPr lang="en-US"/>
           </a:p>
@@ -1973,7 +1973,7 @@
             <a:fld id="{1D8BD707-D9CF-40AE-B4C6-C98DA3205C09}" type="datetimeFigureOut">
               <a:rPr lang="en-US" smtClean="0"/>
               <a:pPr/>
-              <a:t>3/11/2024</a:t>
+              <a:t>3/12/2024</a:t>
             </a:fld>
             <a:endParaRPr lang="en-US"/>
           </a:p>
@@ -2245,7 +2245,7 @@
             <a:fld id="{1D8BD707-D9CF-40AE-B4C6-C98DA3205C09}" type="datetimeFigureOut">
               <a:rPr lang="en-US" smtClean="0"/>
               <a:pPr/>
-              <a:t>3/11/2024</a:t>
+              <a:t>3/12/2024</a:t>
             </a:fld>
             <a:endParaRPr lang="en-US"/>
           </a:p>
@@ -2494,7 +2494,7 @@
             <a:fld id="{1D8BD707-D9CF-40AE-B4C6-C98DA3205C09}" type="datetimeFigureOut">
               <a:rPr lang="en-US" smtClean="0"/>
               <a:pPr/>
-              <a:t>3/11/2024</a:t>
+              <a:t>3/12/2024</a:t>
             </a:fld>
             <a:endParaRPr lang="en-US"/>
           </a:p>
@@ -2702,7 +2702,7 @@
             <a:fld id="{1D8BD707-D9CF-40AE-B4C6-C98DA3205C09}" type="datetimeFigureOut">
               <a:rPr lang="en-US" smtClean="0"/>
               <a:pPr/>
-              <a:t>3/11/2024</a:t>
+              <a:t>3/12/2024</a:t>
             </a:fld>
             <a:endParaRPr lang="en-US"/>
           </a:p>
@@ -3358,7 +3358,7 @@
         <p:spPr>
           <a:xfrm>
             <a:off x="3200400" y="3212224"/>
-            <a:ext cx="12829984" cy="1641475"/>
+            <a:ext cx="12829984" cy="1231106"/>
           </a:xfrm>
           <a:prstGeom prst="rect">
             <a:avLst/>
@@ -3382,7 +3382,7 @@
                 </a:solidFill>
                 <a:latin typeface="Montserrat Classic"/>
               </a:rPr>
-              <a:t>Determining and filtering out aspects of the dataset which hold little value to the problem at hand, handling missing data and understanding modern biological terms and nomenclature.</a:t>
+              <a:t>Determining and filtering aspects of the dataset which hold little value to the problem at hand, handling missing data and understanding modern biological terms and nomenclature.</a:t>
             </a:r>
           </a:p>
         </p:txBody>
@@ -3479,7 +3479,7 @@
                 </a:solidFill>
                 <a:latin typeface="Montserrat Classic"/>
               </a:rPr>
-              <a:t>Finding a method to embed amino acids and V/J genes that balances the preservation of biological meaning while enabling computational efficiency.</a:t>
+              <a:t>Finding a method to embed amino acids and V/J genes that balances the preservation of biological semantics while enabling computational efficiency.</a:t>
             </a:r>
           </a:p>
         </p:txBody>
@@ -3881,7 +3881,7 @@
                 </a:solidFill>
                 <a:latin typeface="Montserrat Classic"/>
               </a:rPr>
-              <a:t>Relied on the effective encoding and embedding of a large quantity of string-type data and incorporated BLOSUM matrices to preserve biological meanings of amino acid sequences.</a:t>
+              <a:t>Relied on the effective encoding and embedding of a large quantity of string-type data and incorporated BLOSUM matrices to preserve biological semantics of amino acid sequences.</a:t>
             </a:r>
           </a:p>
         </p:txBody>
@@ -3927,7 +3927,7 @@
                 </a:solidFill>
                 <a:latin typeface="Montserrat Classic"/>
               </a:rPr>
-              <a:t>The resulting matrices are massive in size as they square matrices with tens of thousands of rows/columns, occupying gigabytes of storage space even when compressed.</a:t>
+              <a:t>The resulting matrices are massive in size as they are square matrices with tens of thousands of rows/columns, occupying gigabytes of storage space even when compressed.</a:t>
             </a:r>
           </a:p>
         </p:txBody>
@@ -4473,20 +4473,20 @@
 </file>
 
 <file path=customXml/item2.xml><?xml version="1.0" encoding="utf-8"?>
+<p:properties xmlns:p="http://schemas.microsoft.com/office/2006/metadata/properties" xmlns:xsi="http://www.w3.org/2001/XMLSchema-instance" xmlns:pc="http://schemas.microsoft.com/office/infopath/2007/PartnerControls">
+  <documentManagement>
+    <_activity xmlns="74de7b5d-c345-4a5c-b4f5-3a2c8901d5f8" xsi:nil="true"/>
+  </documentManagement>
+</p:properties>
+</file>
+
+<file path=customXml/item3.xml><?xml version="1.0" encoding="utf-8"?>
 <?mso-contentType ?>
 <FormTemplates xmlns="http://schemas.microsoft.com/sharepoint/v3/contenttype/forms">
   <Display>DocumentLibraryForm</Display>
   <Edit>DocumentLibraryForm</Edit>
   <New>DocumentLibraryForm</New>
 </FormTemplates>
-</file>
-
-<file path=customXml/item3.xml><?xml version="1.0" encoding="utf-8"?>
-<p:properties xmlns:p="http://schemas.microsoft.com/office/2006/metadata/properties" xmlns:xsi="http://www.w3.org/2001/XMLSchema-instance" xmlns:pc="http://schemas.microsoft.com/office/infopath/2007/PartnerControls">
-  <documentManagement>
-    <_activity xmlns="74de7b5d-c345-4a5c-b4f5-3a2c8901d5f8" xsi:nil="true"/>
-  </documentManagement>
-</p:properties>
 </file>
 
 <file path=customXml/itemProps1.xml><?xml version="1.0" encoding="utf-8"?>
@@ -4509,14 +4509,6 @@
 </file>
 
 <file path=customXml/itemProps2.xml><?xml version="1.0" encoding="utf-8"?>
-<ds:datastoreItem xmlns:ds="http://schemas.openxmlformats.org/officeDocument/2006/customXml" ds:itemID="{435DC249-703B-4225-9E69-E4575702C3A9}">
-  <ds:schemaRefs>
-    <ds:schemaRef ds:uri="http://schemas.microsoft.com/sharepoint/v3/contenttype/forms"/>
-  </ds:schemaRefs>
-</ds:datastoreItem>
-</file>
-
-<file path=customXml/itemProps3.xml><?xml version="1.0" encoding="utf-8"?>
 <ds:datastoreItem xmlns:ds="http://schemas.openxmlformats.org/officeDocument/2006/customXml" ds:itemID="{D6C4D71E-7C28-497E-8F55-2E41ED5AD2A1}">
   <ds:schemaRefs>
     <ds:schemaRef ds:uri="http://schemas.microsoft.com/office/2006/metadata/properties"/>
@@ -4531,4 +4523,12 @@
     <ds:schemaRef ds:uri="http://purl.org/dc/elements/1.1/"/>
   </ds:schemaRefs>
 </ds:datastoreItem>
+</file>
+
+<file path=customXml/itemProps3.xml><?xml version="1.0" encoding="utf-8"?>
+<ds:datastoreItem xmlns:ds="http://schemas.openxmlformats.org/officeDocument/2006/customXml" ds:itemID="{435DC249-703B-4225-9E69-E4575702C3A9}">
+  <ds:schemaRefs>
+    <ds:schemaRef ds:uri="http://schemas.microsoft.com/sharepoint/v3/contenttype/forms"/>
+  </ds:schemaRefs>
+</ds:datastoreItem>
 </file>
</xml_diff>